<commit_message>
Add the mybatis study into pptx
</commit_message>
<xml_diff>
--- a/JavaStudy/MyBatis/MyBatisStudyNote/MyBatisStudyNote.pptx
+++ b/JavaStudy/MyBatis/MyBatisStudyNote/MyBatisStudyNote.pptx
@@ -8,6 +8,8 @@
     <p:sldId id="256" r:id="rId2"/>
     <p:sldId id="257" r:id="rId3"/>
     <p:sldId id="258" r:id="rId4"/>
+    <p:sldId id="259" r:id="rId5"/>
+    <p:sldId id="260" r:id="rId6"/>
   </p:sldIdLst>
   <p:sldSz cx="12192000" cy="6858000"/>
   <p:notesSz cx="6858000" cy="9144000"/>
@@ -106,6 +108,11 @@
       </a:defRPr>
     </a:lvl9pPr>
   </p:defaultTextStyle>
+  <p:extLst>
+    <p:ext uri="{EFAFB233-063F-42B5-8137-9DF3F51BA10A}">
+      <p15:sldGuideLst xmlns:p15="http://schemas.microsoft.com/office/powerpoint/2012/main"/>
+    </p:ext>
+  </p:extLst>
 </p:presentation>
 </file>
 
@@ -151,10 +158,9 @@
           </a:lstStyle>
           <a:p>
             <a:r>
-              <a:rPr lang="zh-CN" altLang="en-US" smtClean="0"/>
+              <a:rPr lang="zh-CN" altLang="en-US"/>
               <a:t>单击此处编辑母版标题样式</a:t>
             </a:r>
-            <a:endParaRPr lang="zh-CN" altLang="en-US"/>
           </a:p>
         </p:txBody>
       </p:sp>
@@ -216,10 +222,9 @@
           </a:lstStyle>
           <a:p>
             <a:r>
-              <a:rPr lang="zh-CN" altLang="en-US" smtClean="0"/>
+              <a:rPr lang="zh-CN" altLang="en-US"/>
               <a:t>单击以编辑母版副标题样式</a:t>
             </a:r>
-            <a:endParaRPr lang="zh-CN" altLang="en-US"/>
           </a:p>
         </p:txBody>
       </p:sp>
@@ -240,7 +245,7 @@
           <a:p>
             <a:fld id="{5169B9EC-2E22-4EBE-8442-BE1B61D95B08}" type="datetimeFigureOut">
               <a:rPr lang="zh-CN" altLang="en-US" smtClean="0"/>
-              <a:t>2023/3/16</a:t>
+              <a:t>2023/3/17</a:t>
             </a:fld>
             <a:endParaRPr lang="zh-CN" altLang="en-US"/>
           </a:p>
@@ -334,10 +339,9 @@
           <a:lstStyle/>
           <a:p>
             <a:r>
-              <a:rPr lang="zh-CN" altLang="en-US" smtClean="0"/>
+              <a:rPr lang="zh-CN" altLang="en-US"/>
               <a:t>单击此处编辑母版标题样式</a:t>
             </a:r>
-            <a:endParaRPr lang="zh-CN" altLang="en-US"/>
           </a:p>
         </p:txBody>
       </p:sp>
@@ -358,38 +362,37 @@
           <a:p>
             <a:pPr lvl="0"/>
             <a:r>
-              <a:rPr lang="zh-CN" altLang="en-US" smtClean="0"/>
+              <a:rPr lang="zh-CN" altLang="en-US"/>
               <a:t>编辑母版文本样式</a:t>
             </a:r>
           </a:p>
           <a:p>
             <a:pPr lvl="1"/>
             <a:r>
-              <a:rPr lang="zh-CN" altLang="en-US" smtClean="0"/>
+              <a:rPr lang="zh-CN" altLang="en-US"/>
               <a:t>第二级</a:t>
             </a:r>
           </a:p>
           <a:p>
             <a:pPr lvl="2"/>
             <a:r>
-              <a:rPr lang="zh-CN" altLang="en-US" smtClean="0"/>
+              <a:rPr lang="zh-CN" altLang="en-US"/>
               <a:t>第三级</a:t>
             </a:r>
           </a:p>
           <a:p>
             <a:pPr lvl="3"/>
             <a:r>
-              <a:rPr lang="zh-CN" altLang="en-US" smtClean="0"/>
+              <a:rPr lang="zh-CN" altLang="en-US"/>
               <a:t>第四级</a:t>
             </a:r>
           </a:p>
           <a:p>
             <a:pPr lvl="4"/>
             <a:r>
-              <a:rPr lang="zh-CN" altLang="en-US" smtClean="0"/>
+              <a:rPr lang="zh-CN" altLang="en-US"/>
               <a:t>第五级</a:t>
             </a:r>
-            <a:endParaRPr lang="zh-CN" altLang="en-US"/>
           </a:p>
         </p:txBody>
       </p:sp>
@@ -410,7 +413,7 @@
           <a:p>
             <a:fld id="{5169B9EC-2E22-4EBE-8442-BE1B61D95B08}" type="datetimeFigureOut">
               <a:rPr lang="zh-CN" altLang="en-US" smtClean="0"/>
-              <a:t>2023/3/16</a:t>
+              <a:t>2023/3/17</a:t>
             </a:fld>
             <a:endParaRPr lang="zh-CN" altLang="en-US"/>
           </a:p>
@@ -509,10 +512,9 @@
           <a:lstStyle/>
           <a:p>
             <a:r>
-              <a:rPr lang="zh-CN" altLang="en-US" smtClean="0"/>
+              <a:rPr lang="zh-CN" altLang="en-US"/>
               <a:t>单击此处编辑母版标题样式</a:t>
             </a:r>
-            <a:endParaRPr lang="zh-CN" altLang="en-US"/>
           </a:p>
         </p:txBody>
       </p:sp>
@@ -538,38 +540,37 @@
           <a:p>
             <a:pPr lvl="0"/>
             <a:r>
-              <a:rPr lang="zh-CN" altLang="en-US" smtClean="0"/>
+              <a:rPr lang="zh-CN" altLang="en-US"/>
               <a:t>编辑母版文本样式</a:t>
             </a:r>
           </a:p>
           <a:p>
             <a:pPr lvl="1"/>
             <a:r>
-              <a:rPr lang="zh-CN" altLang="en-US" smtClean="0"/>
+              <a:rPr lang="zh-CN" altLang="en-US"/>
               <a:t>第二级</a:t>
             </a:r>
           </a:p>
           <a:p>
             <a:pPr lvl="2"/>
             <a:r>
-              <a:rPr lang="zh-CN" altLang="en-US" smtClean="0"/>
+              <a:rPr lang="zh-CN" altLang="en-US"/>
               <a:t>第三级</a:t>
             </a:r>
           </a:p>
           <a:p>
             <a:pPr lvl="3"/>
             <a:r>
-              <a:rPr lang="zh-CN" altLang="en-US" smtClean="0"/>
+              <a:rPr lang="zh-CN" altLang="en-US"/>
               <a:t>第四级</a:t>
             </a:r>
           </a:p>
           <a:p>
             <a:pPr lvl="4"/>
             <a:r>
-              <a:rPr lang="zh-CN" altLang="en-US" smtClean="0"/>
+              <a:rPr lang="zh-CN" altLang="en-US"/>
               <a:t>第五级</a:t>
             </a:r>
-            <a:endParaRPr lang="zh-CN" altLang="en-US"/>
           </a:p>
         </p:txBody>
       </p:sp>
@@ -590,7 +591,7 @@
           <a:p>
             <a:fld id="{5169B9EC-2E22-4EBE-8442-BE1B61D95B08}" type="datetimeFigureOut">
               <a:rPr lang="zh-CN" altLang="en-US" smtClean="0"/>
-              <a:t>2023/3/16</a:t>
+              <a:t>2023/3/17</a:t>
             </a:fld>
             <a:endParaRPr lang="zh-CN" altLang="en-US"/>
           </a:p>
@@ -684,10 +685,9 @@
           <a:lstStyle/>
           <a:p>
             <a:r>
-              <a:rPr lang="zh-CN" altLang="en-US" smtClean="0"/>
+              <a:rPr lang="zh-CN" altLang="en-US"/>
               <a:t>单击此处编辑母版标题样式</a:t>
             </a:r>
-            <a:endParaRPr lang="zh-CN" altLang="en-US"/>
           </a:p>
         </p:txBody>
       </p:sp>
@@ -708,38 +708,37 @@
           <a:p>
             <a:pPr lvl="0"/>
             <a:r>
-              <a:rPr lang="zh-CN" altLang="en-US" smtClean="0"/>
+              <a:rPr lang="zh-CN" altLang="en-US"/>
               <a:t>编辑母版文本样式</a:t>
             </a:r>
           </a:p>
           <a:p>
             <a:pPr lvl="1"/>
             <a:r>
-              <a:rPr lang="zh-CN" altLang="en-US" smtClean="0"/>
+              <a:rPr lang="zh-CN" altLang="en-US"/>
               <a:t>第二级</a:t>
             </a:r>
           </a:p>
           <a:p>
             <a:pPr lvl="2"/>
             <a:r>
-              <a:rPr lang="zh-CN" altLang="en-US" smtClean="0"/>
+              <a:rPr lang="zh-CN" altLang="en-US"/>
               <a:t>第三级</a:t>
             </a:r>
           </a:p>
           <a:p>
             <a:pPr lvl="3"/>
             <a:r>
-              <a:rPr lang="zh-CN" altLang="en-US" smtClean="0"/>
+              <a:rPr lang="zh-CN" altLang="en-US"/>
               <a:t>第四级</a:t>
             </a:r>
           </a:p>
           <a:p>
             <a:pPr lvl="4"/>
             <a:r>
-              <a:rPr lang="zh-CN" altLang="en-US" smtClean="0"/>
+              <a:rPr lang="zh-CN" altLang="en-US"/>
               <a:t>第五级</a:t>
             </a:r>
-            <a:endParaRPr lang="zh-CN" altLang="en-US"/>
           </a:p>
         </p:txBody>
       </p:sp>
@@ -760,7 +759,7 @@
           <a:p>
             <a:fld id="{5169B9EC-2E22-4EBE-8442-BE1B61D95B08}" type="datetimeFigureOut">
               <a:rPr lang="zh-CN" altLang="en-US" smtClean="0"/>
-              <a:t>2023/3/16</a:t>
+              <a:t>2023/3/17</a:t>
             </a:fld>
             <a:endParaRPr lang="zh-CN" altLang="en-US"/>
           </a:p>
@@ -863,10 +862,9 @@
           </a:lstStyle>
           <a:p>
             <a:r>
-              <a:rPr lang="zh-CN" altLang="en-US" smtClean="0"/>
+              <a:rPr lang="zh-CN" altLang="en-US"/>
               <a:t>单击此处编辑母版标题样式</a:t>
             </a:r>
-            <a:endParaRPr lang="zh-CN" altLang="en-US"/>
           </a:p>
         </p:txBody>
       </p:sp>
@@ -983,7 +981,7 @@
           <a:p>
             <a:pPr lvl="0"/>
             <a:r>
-              <a:rPr lang="zh-CN" altLang="en-US" smtClean="0"/>
+              <a:rPr lang="zh-CN" altLang="en-US"/>
               <a:t>编辑母版文本样式</a:t>
             </a:r>
           </a:p>
@@ -1006,7 +1004,7 @@
           <a:p>
             <a:fld id="{5169B9EC-2E22-4EBE-8442-BE1B61D95B08}" type="datetimeFigureOut">
               <a:rPr lang="zh-CN" altLang="en-US" smtClean="0"/>
-              <a:t>2023/3/16</a:t>
+              <a:t>2023/3/17</a:t>
             </a:fld>
             <a:endParaRPr lang="zh-CN" altLang="en-US"/>
           </a:p>
@@ -1100,10 +1098,9 @@
           <a:lstStyle/>
           <a:p>
             <a:r>
-              <a:rPr lang="zh-CN" altLang="en-US" smtClean="0"/>
+              <a:rPr lang="zh-CN" altLang="en-US"/>
               <a:t>单击此处编辑母版标题样式</a:t>
             </a:r>
-            <a:endParaRPr lang="zh-CN" altLang="en-US"/>
           </a:p>
         </p:txBody>
       </p:sp>
@@ -1129,38 +1126,37 @@
           <a:p>
             <a:pPr lvl="0"/>
             <a:r>
-              <a:rPr lang="zh-CN" altLang="en-US" smtClean="0"/>
+              <a:rPr lang="zh-CN" altLang="en-US"/>
               <a:t>编辑母版文本样式</a:t>
             </a:r>
           </a:p>
           <a:p>
             <a:pPr lvl="1"/>
             <a:r>
-              <a:rPr lang="zh-CN" altLang="en-US" smtClean="0"/>
+              <a:rPr lang="zh-CN" altLang="en-US"/>
               <a:t>第二级</a:t>
             </a:r>
           </a:p>
           <a:p>
             <a:pPr lvl="2"/>
             <a:r>
-              <a:rPr lang="zh-CN" altLang="en-US" smtClean="0"/>
+              <a:rPr lang="zh-CN" altLang="en-US"/>
               <a:t>第三级</a:t>
             </a:r>
           </a:p>
           <a:p>
             <a:pPr lvl="3"/>
             <a:r>
-              <a:rPr lang="zh-CN" altLang="en-US" smtClean="0"/>
+              <a:rPr lang="zh-CN" altLang="en-US"/>
               <a:t>第四级</a:t>
             </a:r>
           </a:p>
           <a:p>
             <a:pPr lvl="4"/>
             <a:r>
-              <a:rPr lang="zh-CN" altLang="en-US" smtClean="0"/>
+              <a:rPr lang="zh-CN" altLang="en-US"/>
               <a:t>第五级</a:t>
             </a:r>
-            <a:endParaRPr lang="zh-CN" altLang="en-US"/>
           </a:p>
         </p:txBody>
       </p:sp>
@@ -1186,38 +1182,37 @@
           <a:p>
             <a:pPr lvl="0"/>
             <a:r>
-              <a:rPr lang="zh-CN" altLang="en-US" smtClean="0"/>
+              <a:rPr lang="zh-CN" altLang="en-US"/>
               <a:t>编辑母版文本样式</a:t>
             </a:r>
           </a:p>
           <a:p>
             <a:pPr lvl="1"/>
             <a:r>
-              <a:rPr lang="zh-CN" altLang="en-US" smtClean="0"/>
+              <a:rPr lang="zh-CN" altLang="en-US"/>
               <a:t>第二级</a:t>
             </a:r>
           </a:p>
           <a:p>
             <a:pPr lvl="2"/>
             <a:r>
-              <a:rPr lang="zh-CN" altLang="en-US" smtClean="0"/>
+              <a:rPr lang="zh-CN" altLang="en-US"/>
               <a:t>第三级</a:t>
             </a:r>
           </a:p>
           <a:p>
             <a:pPr lvl="3"/>
             <a:r>
-              <a:rPr lang="zh-CN" altLang="en-US" smtClean="0"/>
+              <a:rPr lang="zh-CN" altLang="en-US"/>
               <a:t>第四级</a:t>
             </a:r>
           </a:p>
           <a:p>
             <a:pPr lvl="4"/>
             <a:r>
-              <a:rPr lang="zh-CN" altLang="en-US" smtClean="0"/>
+              <a:rPr lang="zh-CN" altLang="en-US"/>
               <a:t>第五级</a:t>
             </a:r>
-            <a:endParaRPr lang="zh-CN" altLang="en-US"/>
           </a:p>
         </p:txBody>
       </p:sp>
@@ -1238,7 +1233,7 @@
           <a:p>
             <a:fld id="{5169B9EC-2E22-4EBE-8442-BE1B61D95B08}" type="datetimeFigureOut">
               <a:rPr lang="zh-CN" altLang="en-US" smtClean="0"/>
-              <a:t>2023/3/16</a:t>
+              <a:t>2023/3/17</a:t>
             </a:fld>
             <a:endParaRPr lang="zh-CN" altLang="en-US"/>
           </a:p>
@@ -1337,10 +1332,9 @@
           <a:lstStyle/>
           <a:p>
             <a:r>
-              <a:rPr lang="zh-CN" altLang="en-US" smtClean="0"/>
+              <a:rPr lang="zh-CN" altLang="en-US"/>
               <a:t>单击此处编辑母版标题样式</a:t>
             </a:r>
-            <a:endParaRPr lang="zh-CN" altLang="en-US"/>
           </a:p>
         </p:txBody>
       </p:sp>
@@ -1403,7 +1397,7 @@
           <a:p>
             <a:pPr lvl="0"/>
             <a:r>
-              <a:rPr lang="zh-CN" altLang="en-US" smtClean="0"/>
+              <a:rPr lang="zh-CN" altLang="en-US"/>
               <a:t>编辑母版文本样式</a:t>
             </a:r>
           </a:p>
@@ -1431,38 +1425,37 @@
           <a:p>
             <a:pPr lvl="0"/>
             <a:r>
-              <a:rPr lang="zh-CN" altLang="en-US" smtClean="0"/>
+              <a:rPr lang="zh-CN" altLang="en-US"/>
               <a:t>编辑母版文本样式</a:t>
             </a:r>
           </a:p>
           <a:p>
             <a:pPr lvl="1"/>
             <a:r>
-              <a:rPr lang="zh-CN" altLang="en-US" smtClean="0"/>
+              <a:rPr lang="zh-CN" altLang="en-US"/>
               <a:t>第二级</a:t>
             </a:r>
           </a:p>
           <a:p>
             <a:pPr lvl="2"/>
             <a:r>
-              <a:rPr lang="zh-CN" altLang="en-US" smtClean="0"/>
+              <a:rPr lang="zh-CN" altLang="en-US"/>
               <a:t>第三级</a:t>
             </a:r>
           </a:p>
           <a:p>
             <a:pPr lvl="3"/>
             <a:r>
-              <a:rPr lang="zh-CN" altLang="en-US" smtClean="0"/>
+              <a:rPr lang="zh-CN" altLang="en-US"/>
               <a:t>第四级</a:t>
             </a:r>
           </a:p>
           <a:p>
             <a:pPr lvl="4"/>
             <a:r>
-              <a:rPr lang="zh-CN" altLang="en-US" smtClean="0"/>
+              <a:rPr lang="zh-CN" altLang="en-US"/>
               <a:t>第五级</a:t>
             </a:r>
-            <a:endParaRPr lang="zh-CN" altLang="en-US"/>
           </a:p>
         </p:txBody>
       </p:sp>
@@ -1525,7 +1518,7 @@
           <a:p>
             <a:pPr lvl="0"/>
             <a:r>
-              <a:rPr lang="zh-CN" altLang="en-US" smtClean="0"/>
+              <a:rPr lang="zh-CN" altLang="en-US"/>
               <a:t>编辑母版文本样式</a:t>
             </a:r>
           </a:p>
@@ -1553,38 +1546,37 @@
           <a:p>
             <a:pPr lvl="0"/>
             <a:r>
-              <a:rPr lang="zh-CN" altLang="en-US" smtClean="0"/>
+              <a:rPr lang="zh-CN" altLang="en-US"/>
               <a:t>编辑母版文本样式</a:t>
             </a:r>
           </a:p>
           <a:p>
             <a:pPr lvl="1"/>
             <a:r>
-              <a:rPr lang="zh-CN" altLang="en-US" smtClean="0"/>
+              <a:rPr lang="zh-CN" altLang="en-US"/>
               <a:t>第二级</a:t>
             </a:r>
           </a:p>
           <a:p>
             <a:pPr lvl="2"/>
             <a:r>
-              <a:rPr lang="zh-CN" altLang="en-US" smtClean="0"/>
+              <a:rPr lang="zh-CN" altLang="en-US"/>
               <a:t>第三级</a:t>
             </a:r>
           </a:p>
           <a:p>
             <a:pPr lvl="3"/>
             <a:r>
-              <a:rPr lang="zh-CN" altLang="en-US" smtClean="0"/>
+              <a:rPr lang="zh-CN" altLang="en-US"/>
               <a:t>第四级</a:t>
             </a:r>
           </a:p>
           <a:p>
             <a:pPr lvl="4"/>
             <a:r>
-              <a:rPr lang="zh-CN" altLang="en-US" smtClean="0"/>
+              <a:rPr lang="zh-CN" altLang="en-US"/>
               <a:t>第五级</a:t>
             </a:r>
-            <a:endParaRPr lang="zh-CN" altLang="en-US"/>
           </a:p>
         </p:txBody>
       </p:sp>
@@ -1605,7 +1597,7 @@
           <a:p>
             <a:fld id="{5169B9EC-2E22-4EBE-8442-BE1B61D95B08}" type="datetimeFigureOut">
               <a:rPr lang="zh-CN" altLang="en-US" smtClean="0"/>
-              <a:t>2023/3/16</a:t>
+              <a:t>2023/3/17</a:t>
             </a:fld>
             <a:endParaRPr lang="zh-CN" altLang="en-US"/>
           </a:p>
@@ -1699,10 +1691,9 @@
           <a:lstStyle/>
           <a:p>
             <a:r>
-              <a:rPr lang="zh-CN" altLang="en-US" smtClean="0"/>
+              <a:rPr lang="zh-CN" altLang="en-US"/>
               <a:t>单击此处编辑母版标题样式</a:t>
             </a:r>
-            <a:endParaRPr lang="zh-CN" altLang="en-US"/>
           </a:p>
         </p:txBody>
       </p:sp>
@@ -1723,7 +1714,7 @@
           <a:p>
             <a:fld id="{5169B9EC-2E22-4EBE-8442-BE1B61D95B08}" type="datetimeFigureOut">
               <a:rPr lang="zh-CN" altLang="en-US" smtClean="0"/>
-              <a:t>2023/3/16</a:t>
+              <a:t>2023/3/17</a:t>
             </a:fld>
             <a:endParaRPr lang="zh-CN" altLang="en-US"/>
           </a:p>
@@ -1818,7 +1809,7 @@
           <a:p>
             <a:fld id="{5169B9EC-2E22-4EBE-8442-BE1B61D95B08}" type="datetimeFigureOut">
               <a:rPr lang="zh-CN" altLang="en-US" smtClean="0"/>
-              <a:t>2023/3/16</a:t>
+              <a:t>2023/3/17</a:t>
             </a:fld>
             <a:endParaRPr lang="zh-CN" altLang="en-US"/>
           </a:p>
@@ -1921,10 +1912,9 @@
           </a:lstStyle>
           <a:p>
             <a:r>
-              <a:rPr lang="zh-CN" altLang="en-US" smtClean="0"/>
+              <a:rPr lang="zh-CN" altLang="en-US"/>
               <a:t>单击此处编辑母版标题样式</a:t>
             </a:r>
-            <a:endParaRPr lang="zh-CN" altLang="en-US"/>
           </a:p>
         </p:txBody>
       </p:sp>
@@ -1978,38 +1968,37 @@
           <a:p>
             <a:pPr lvl="0"/>
             <a:r>
-              <a:rPr lang="zh-CN" altLang="en-US" smtClean="0"/>
+              <a:rPr lang="zh-CN" altLang="en-US"/>
               <a:t>编辑母版文本样式</a:t>
             </a:r>
           </a:p>
           <a:p>
             <a:pPr lvl="1"/>
             <a:r>
-              <a:rPr lang="zh-CN" altLang="en-US" smtClean="0"/>
+              <a:rPr lang="zh-CN" altLang="en-US"/>
               <a:t>第二级</a:t>
             </a:r>
           </a:p>
           <a:p>
             <a:pPr lvl="2"/>
             <a:r>
-              <a:rPr lang="zh-CN" altLang="en-US" smtClean="0"/>
+              <a:rPr lang="zh-CN" altLang="en-US"/>
               <a:t>第三级</a:t>
             </a:r>
           </a:p>
           <a:p>
             <a:pPr lvl="3"/>
             <a:r>
-              <a:rPr lang="zh-CN" altLang="en-US" smtClean="0"/>
+              <a:rPr lang="zh-CN" altLang="en-US"/>
               <a:t>第四级</a:t>
             </a:r>
           </a:p>
           <a:p>
             <a:pPr lvl="4"/>
             <a:r>
-              <a:rPr lang="zh-CN" altLang="en-US" smtClean="0"/>
+              <a:rPr lang="zh-CN" altLang="en-US"/>
               <a:t>第五级</a:t>
             </a:r>
-            <a:endParaRPr lang="zh-CN" altLang="en-US"/>
           </a:p>
         </p:txBody>
       </p:sp>
@@ -2072,7 +2061,7 @@
           <a:p>
             <a:pPr lvl="0"/>
             <a:r>
-              <a:rPr lang="zh-CN" altLang="en-US" smtClean="0"/>
+              <a:rPr lang="zh-CN" altLang="en-US"/>
               <a:t>编辑母版文本样式</a:t>
             </a:r>
           </a:p>
@@ -2095,7 +2084,7 @@
           <a:p>
             <a:fld id="{5169B9EC-2E22-4EBE-8442-BE1B61D95B08}" type="datetimeFigureOut">
               <a:rPr lang="zh-CN" altLang="en-US" smtClean="0"/>
-              <a:t>2023/3/16</a:t>
+              <a:t>2023/3/17</a:t>
             </a:fld>
             <a:endParaRPr lang="zh-CN" altLang="en-US"/>
           </a:p>
@@ -2198,10 +2187,9 @@
           </a:lstStyle>
           <a:p>
             <a:r>
-              <a:rPr lang="zh-CN" altLang="en-US" smtClean="0"/>
+              <a:rPr lang="zh-CN" altLang="en-US"/>
               <a:t>单击此处编辑母版标题样式</a:t>
             </a:r>
-            <a:endParaRPr lang="zh-CN" altLang="en-US"/>
           </a:p>
         </p:txBody>
       </p:sp>
@@ -2325,7 +2313,7 @@
           <a:p>
             <a:pPr lvl="0"/>
             <a:r>
-              <a:rPr lang="zh-CN" altLang="en-US" smtClean="0"/>
+              <a:rPr lang="zh-CN" altLang="en-US"/>
               <a:t>编辑母版文本样式</a:t>
             </a:r>
           </a:p>
@@ -2348,7 +2336,7 @@
           <a:p>
             <a:fld id="{5169B9EC-2E22-4EBE-8442-BE1B61D95B08}" type="datetimeFigureOut">
               <a:rPr lang="zh-CN" altLang="en-US" smtClean="0"/>
-              <a:t>2023/3/16</a:t>
+              <a:t>2023/3/17</a:t>
             </a:fld>
             <a:endParaRPr lang="zh-CN" altLang="en-US"/>
           </a:p>
@@ -2457,10 +2445,9 @@
           <a:lstStyle/>
           <a:p>
             <a:r>
-              <a:rPr lang="zh-CN" altLang="en-US" smtClean="0"/>
+              <a:rPr lang="zh-CN" altLang="en-US"/>
               <a:t>单击此处编辑母版标题样式</a:t>
             </a:r>
-            <a:endParaRPr lang="zh-CN" altLang="en-US"/>
           </a:p>
         </p:txBody>
       </p:sp>
@@ -2491,38 +2478,37 @@
           <a:p>
             <a:pPr lvl="0"/>
             <a:r>
-              <a:rPr lang="zh-CN" altLang="en-US" smtClean="0"/>
+              <a:rPr lang="zh-CN" altLang="en-US"/>
               <a:t>编辑母版文本样式</a:t>
             </a:r>
           </a:p>
           <a:p>
             <a:pPr lvl="1"/>
             <a:r>
-              <a:rPr lang="zh-CN" altLang="en-US" smtClean="0"/>
+              <a:rPr lang="zh-CN" altLang="en-US"/>
               <a:t>第二级</a:t>
             </a:r>
           </a:p>
           <a:p>
             <a:pPr lvl="2"/>
             <a:r>
-              <a:rPr lang="zh-CN" altLang="en-US" smtClean="0"/>
+              <a:rPr lang="zh-CN" altLang="en-US"/>
               <a:t>第三级</a:t>
             </a:r>
           </a:p>
           <a:p>
             <a:pPr lvl="3"/>
             <a:r>
-              <a:rPr lang="zh-CN" altLang="en-US" smtClean="0"/>
+              <a:rPr lang="zh-CN" altLang="en-US"/>
               <a:t>第四级</a:t>
             </a:r>
           </a:p>
           <a:p>
             <a:pPr lvl="4"/>
             <a:r>
-              <a:rPr lang="zh-CN" altLang="en-US" smtClean="0"/>
+              <a:rPr lang="zh-CN" altLang="en-US"/>
               <a:t>第五级</a:t>
             </a:r>
-            <a:endParaRPr lang="zh-CN" altLang="en-US"/>
           </a:p>
         </p:txBody>
       </p:sp>
@@ -2561,7 +2547,7 @@
           <a:p>
             <a:fld id="{5169B9EC-2E22-4EBE-8442-BE1B61D95B08}" type="datetimeFigureOut">
               <a:rPr lang="zh-CN" altLang="en-US" smtClean="0"/>
-              <a:t>2023/3/16</a:t>
+              <a:t>2023/3/17</a:t>
             </a:fld>
             <a:endParaRPr lang="zh-CN" altLang="en-US"/>
           </a:p>
@@ -2982,11 +2968,11 @@
           <a:lstStyle/>
           <a:p>
             <a:r>
-              <a:rPr lang="en-US" altLang="zh-CN" dirty="0" err="1" smtClean="0"/>
+              <a:rPr lang="en-US" altLang="zh-CN" dirty="0" err="1"/>
               <a:t>MyBatis</a:t>
             </a:r>
             <a:r>
-              <a:rPr lang="en-US" altLang="zh-CN" dirty="0" smtClean="0"/>
+              <a:rPr lang="en-US" altLang="zh-CN" dirty="0"/>
               <a:t> Study</a:t>
             </a:r>
             <a:endParaRPr lang="zh-CN" altLang="en-US" dirty="0"/>
@@ -3032,7 +3018,7 @@
         <p:spPr>
           <a:xfrm>
             <a:off x="429491" y="415636"/>
-            <a:ext cx="1879041" cy="923330"/>
+            <a:ext cx="1941557" cy="923330"/>
           </a:xfrm>
           <a:prstGeom prst="rect">
             <a:avLst/>
@@ -3046,21 +3032,21 @@
           <a:lstStyle/>
           <a:p>
             <a:r>
-              <a:rPr lang="en-US" altLang="zh-CN" dirty="0" err="1" smtClean="0"/>
+              <a:rPr lang="en-US" altLang="zh-CN" b="1" u="sng" dirty="0" err="1"/>
               <a:t>MyBatis</a:t>
             </a:r>
             <a:r>
-              <a:rPr lang="zh-CN" altLang="en-US" dirty="0" smtClean="0"/>
+              <a:rPr lang="zh-CN" altLang="en-US" b="1" u="sng" dirty="0"/>
               <a:t>整体架构</a:t>
             </a:r>
-            <a:endParaRPr lang="en-US" altLang="zh-CN" dirty="0" smtClean="0"/>
+            <a:endParaRPr lang="en-US" altLang="zh-CN" b="1" u="sng" dirty="0"/>
           </a:p>
           <a:p>
             <a:endParaRPr lang="en-US" altLang="zh-CN" dirty="0"/>
           </a:p>
           <a:p>
             <a:r>
-              <a:rPr lang="en-US" altLang="zh-CN" dirty="0" smtClean="0"/>
+              <a:rPr lang="en-US" altLang="zh-CN" dirty="0"/>
               <a:t>	</a:t>
             </a:r>
           </a:p>
@@ -3156,10 +3142,584 @@
           </a:prstGeom>
         </p:spPr>
       </p:pic>
+      <p:sp>
+        <p:nvSpPr>
+          <p:cNvPr id="2" name="文字方塊 1">
+            <a:extLst>
+              <a:ext uri="{FF2B5EF4-FFF2-40B4-BE49-F238E27FC236}">
+                <a16:creationId xmlns:a16="http://schemas.microsoft.com/office/drawing/2014/main" id="{9ED33BAC-437E-431D-A093-C1B382107226}"/>
+              </a:ext>
+            </a:extLst>
+          </p:cNvPr>
+          <p:cNvSpPr txBox="1"/>
+          <p:nvPr/>
+        </p:nvSpPr>
+        <p:spPr>
+          <a:xfrm>
+            <a:off x="243840" y="386080"/>
+            <a:ext cx="3520516" cy="369332"/>
+          </a:xfrm>
+          <a:prstGeom prst="rect">
+            <a:avLst/>
+          </a:prstGeom>
+          <a:noFill/>
+        </p:spPr>
+        <p:txBody>
+          <a:bodyPr wrap="none" rtlCol="0">
+            <a:spAutoFit/>
+          </a:bodyPr>
+          <a:lstStyle/>
+          <a:p>
+            <a:r>
+              <a:rPr lang="en-US" altLang="zh-CN" b="1" u="sng" dirty="0" err="1"/>
+              <a:t>MyBatis</a:t>
+            </a:r>
+            <a:r>
+              <a:rPr lang="zh-CN" altLang="en-US" b="1" u="sng" dirty="0"/>
+              <a:t>执行一条</a:t>
+            </a:r>
+            <a:r>
+              <a:rPr lang="en-US" altLang="zh-CN" b="1" u="sng" dirty="0"/>
+              <a:t>SQL</a:t>
+            </a:r>
+            <a:r>
+              <a:rPr lang="zh-CN" altLang="en-US" b="1" u="sng" dirty="0"/>
+              <a:t>语句的过程</a:t>
+            </a:r>
+            <a:endParaRPr lang="zh-TW" altLang="en-US" b="1" u="sng" dirty="0"/>
+          </a:p>
+        </p:txBody>
+      </p:sp>
     </p:spTree>
     <p:extLst>
       <p:ext uri="{BB962C8B-B14F-4D97-AF65-F5344CB8AC3E}">
         <p14:creationId xmlns:p14="http://schemas.microsoft.com/office/powerpoint/2010/main" val="741159038"/>
+      </p:ext>
+    </p:extLst>
+  </p:cSld>
+  <p:clrMapOvr>
+    <a:masterClrMapping/>
+  </p:clrMapOvr>
+</p:sld>
+</file>
+
+<file path=ppt/slides/slide4.xml><?xml version="1.0" encoding="utf-8"?>
+<p:sld xmlns:a="http://schemas.openxmlformats.org/drawingml/2006/main" xmlns:r="http://schemas.openxmlformats.org/officeDocument/2006/relationships" xmlns:p="http://schemas.openxmlformats.org/presentationml/2006/main">
+  <p:cSld>
+    <p:spTree>
+      <p:nvGrpSpPr>
+        <p:cNvPr id="1" name=""/>
+        <p:cNvGrpSpPr/>
+        <p:nvPr/>
+      </p:nvGrpSpPr>
+      <p:grpSpPr>
+        <a:xfrm>
+          <a:off x="0" y="0"/>
+          <a:ext cx="0" cy="0"/>
+          <a:chOff x="0" y="0"/>
+          <a:chExt cx="0" cy="0"/>
+        </a:xfrm>
+      </p:grpSpPr>
+      <p:sp>
+        <p:nvSpPr>
+          <p:cNvPr id="4" name="文字方塊 3">
+            <a:extLst>
+              <a:ext uri="{FF2B5EF4-FFF2-40B4-BE49-F238E27FC236}">
+                <a16:creationId xmlns:a16="http://schemas.microsoft.com/office/drawing/2014/main" id="{9883ECFA-6729-45CE-89B9-A548D6B82FC7}"/>
+              </a:ext>
+            </a:extLst>
+          </p:cNvPr>
+          <p:cNvSpPr txBox="1"/>
+          <p:nvPr/>
+        </p:nvSpPr>
+        <p:spPr>
+          <a:xfrm>
+            <a:off x="264160" y="345440"/>
+            <a:ext cx="1154483" cy="369332"/>
+          </a:xfrm>
+          <a:prstGeom prst="rect">
+            <a:avLst/>
+          </a:prstGeom>
+          <a:noFill/>
+        </p:spPr>
+        <p:txBody>
+          <a:bodyPr wrap="none" rtlCol="0">
+            <a:spAutoFit/>
+          </a:bodyPr>
+          <a:lstStyle/>
+          <a:p>
+            <a:r>
+              <a:rPr lang="en-US" altLang="zh-TW" b="1" u="sng" dirty="0"/>
+              <a:t>Dom</a:t>
+            </a:r>
+            <a:r>
+              <a:rPr lang="zh-CN" altLang="en-US" b="1" u="sng" dirty="0"/>
+              <a:t>解析</a:t>
+            </a:r>
+            <a:endParaRPr lang="zh-TW" altLang="en-US" b="1" u="sng" dirty="0"/>
+          </a:p>
+        </p:txBody>
+      </p:sp>
+      <p:pic>
+        <p:nvPicPr>
+          <p:cNvPr id="6" name="圖片 5">
+            <a:extLst>
+              <a:ext uri="{FF2B5EF4-FFF2-40B4-BE49-F238E27FC236}">
+                <a16:creationId xmlns:a16="http://schemas.microsoft.com/office/drawing/2014/main" id="{13AC8CAA-9DE3-45DC-BC39-7B148D14DA36}"/>
+              </a:ext>
+            </a:extLst>
+          </p:cNvPr>
+          <p:cNvPicPr>
+            <a:picLocks noChangeAspect="1"/>
+          </p:cNvPicPr>
+          <p:nvPr/>
+        </p:nvPicPr>
+        <p:blipFill>
+          <a:blip r:embed="rId2">
+            <a:extLst>
+              <a:ext uri="{28A0092B-C50C-407E-A947-70E740481C1C}">
+                <a14:useLocalDpi xmlns:a14="http://schemas.microsoft.com/office/drawing/2010/main" val="0"/>
+              </a:ext>
+            </a:extLst>
+          </a:blip>
+          <a:stretch>
+            <a:fillRect/>
+          </a:stretch>
+        </p:blipFill>
+        <p:spPr>
+          <a:xfrm>
+            <a:off x="1680086" y="1559988"/>
+            <a:ext cx="7728074" cy="3738023"/>
+          </a:xfrm>
+          <a:prstGeom prst="rect">
+            <a:avLst/>
+          </a:prstGeom>
+        </p:spPr>
+      </p:pic>
+      <p:sp>
+        <p:nvSpPr>
+          <p:cNvPr id="7" name="文字方塊 6">
+            <a:extLst>
+              <a:ext uri="{FF2B5EF4-FFF2-40B4-BE49-F238E27FC236}">
+                <a16:creationId xmlns:a16="http://schemas.microsoft.com/office/drawing/2014/main" id="{B91CE578-DE64-4484-A253-1A0CFB9B7923}"/>
+              </a:ext>
+            </a:extLst>
+          </p:cNvPr>
+          <p:cNvSpPr txBox="1"/>
+          <p:nvPr/>
+        </p:nvSpPr>
+        <p:spPr>
+          <a:xfrm>
+            <a:off x="1205803" y="1148081"/>
+            <a:ext cx="9042400" cy="646331"/>
+          </a:xfrm>
+          <a:prstGeom prst="rect">
+            <a:avLst/>
+          </a:prstGeom>
+          <a:noFill/>
+        </p:spPr>
+        <p:txBody>
+          <a:bodyPr wrap="square" rtlCol="0">
+            <a:spAutoFit/>
+          </a:bodyPr>
+          <a:lstStyle/>
+          <a:p>
+            <a:r>
+              <a:rPr lang="en-US" altLang="zh-CN" dirty="0"/>
+              <a:t>1.  </a:t>
+            </a:r>
+            <a:r>
+              <a:rPr lang="zh-CN" altLang="en-US" dirty="0"/>
+              <a:t>将</a:t>
+            </a:r>
+            <a:r>
+              <a:rPr lang="en-US" altLang="zh-CN" dirty="0"/>
+              <a:t>XML</a:t>
+            </a:r>
+            <a:r>
+              <a:rPr lang="zh-CN" altLang="en-US" dirty="0"/>
+              <a:t>文件解析成下面表格的形式</a:t>
+            </a:r>
+            <a:r>
+              <a:rPr lang="en-US" altLang="zh-CN" dirty="0"/>
+              <a:t>,  </a:t>
+            </a:r>
+            <a:r>
+              <a:rPr lang="zh-CN" altLang="en-US" dirty="0"/>
+              <a:t>将整个</a:t>
+            </a:r>
+            <a:r>
+              <a:rPr lang="en-US" altLang="zh-CN" dirty="0"/>
+              <a:t>XML</a:t>
+            </a:r>
+            <a:r>
+              <a:rPr lang="zh-CN" altLang="en-US" dirty="0"/>
+              <a:t>文件读入内存并构建一个</a:t>
+            </a:r>
+            <a:r>
+              <a:rPr lang="en-US" altLang="zh-CN" dirty="0"/>
+              <a:t>DOM</a:t>
+            </a:r>
+            <a:r>
+              <a:rPr lang="zh-CN" altLang="en-US" dirty="0"/>
+              <a:t>树</a:t>
+            </a:r>
+            <a:r>
+              <a:rPr lang="en-US" altLang="zh-CN" dirty="0"/>
+              <a:t>, </a:t>
+            </a:r>
+            <a:r>
+              <a:rPr lang="zh-CN" altLang="en-US" dirty="0"/>
+              <a:t>基于这个树形结构对各个节点进行操作</a:t>
+            </a:r>
+            <a:r>
+              <a:rPr lang="en-US" altLang="zh-CN" dirty="0"/>
+              <a:t>.</a:t>
+            </a:r>
+            <a:endParaRPr lang="zh-TW" altLang="en-US" dirty="0"/>
+          </a:p>
+        </p:txBody>
+      </p:sp>
+      <p:sp>
+        <p:nvSpPr>
+          <p:cNvPr id="8" name="文字方塊 7">
+            <a:extLst>
+              <a:ext uri="{FF2B5EF4-FFF2-40B4-BE49-F238E27FC236}">
+                <a16:creationId xmlns:a16="http://schemas.microsoft.com/office/drawing/2014/main" id="{04B0026E-283E-43F5-90D1-67343A46B50A}"/>
+              </a:ext>
+            </a:extLst>
+          </p:cNvPr>
+          <p:cNvSpPr txBox="1"/>
+          <p:nvPr/>
+        </p:nvSpPr>
+        <p:spPr>
+          <a:xfrm>
+            <a:off x="3108960" y="5435600"/>
+            <a:ext cx="4639412" cy="369332"/>
+          </a:xfrm>
+          <a:prstGeom prst="rect">
+            <a:avLst/>
+          </a:prstGeom>
+          <a:noFill/>
+        </p:spPr>
+        <p:txBody>
+          <a:bodyPr wrap="none" rtlCol="0">
+            <a:spAutoFit/>
+          </a:bodyPr>
+          <a:lstStyle/>
+          <a:p>
+            <a:r>
+              <a:rPr lang="zh-CN" altLang="en-US" dirty="0"/>
+              <a:t>缺点</a:t>
+            </a:r>
+            <a:r>
+              <a:rPr lang="en-US" altLang="zh-CN" dirty="0"/>
+              <a:t>:    </a:t>
+            </a:r>
+            <a:r>
+              <a:rPr lang="zh-CN" altLang="en-US" dirty="0">
+                <a:solidFill>
+                  <a:srgbClr val="FF0000"/>
+                </a:solidFill>
+              </a:rPr>
+              <a:t>当</a:t>
+            </a:r>
+            <a:r>
+              <a:rPr lang="en-US" altLang="zh-CN" dirty="0">
+                <a:solidFill>
+                  <a:srgbClr val="FF0000"/>
+                </a:solidFill>
+              </a:rPr>
+              <a:t>xml</a:t>
+            </a:r>
+            <a:r>
+              <a:rPr lang="zh-CN" altLang="en-US" dirty="0">
+                <a:solidFill>
+                  <a:srgbClr val="FF0000"/>
+                </a:solidFill>
+              </a:rPr>
+              <a:t>文件巨大时</a:t>
+            </a:r>
+            <a:r>
+              <a:rPr lang="en-US" altLang="zh-CN" dirty="0">
+                <a:solidFill>
+                  <a:srgbClr val="FF0000"/>
+                </a:solidFill>
+              </a:rPr>
+              <a:t>, </a:t>
+            </a:r>
+            <a:r>
+              <a:rPr lang="zh-CN" altLang="en-US" dirty="0">
+                <a:solidFill>
+                  <a:srgbClr val="FF0000"/>
+                </a:solidFill>
+              </a:rPr>
+              <a:t>会消耗较大的资源</a:t>
+            </a:r>
+            <a:endParaRPr lang="zh-TW" altLang="en-US" dirty="0">
+              <a:solidFill>
+                <a:srgbClr val="FF0000"/>
+              </a:solidFill>
+            </a:endParaRPr>
+          </a:p>
+        </p:txBody>
+      </p:sp>
+    </p:spTree>
+    <p:extLst>
+      <p:ext uri="{BB962C8B-B14F-4D97-AF65-F5344CB8AC3E}">
+        <p14:creationId xmlns:p14="http://schemas.microsoft.com/office/powerpoint/2010/main" val="2999775101"/>
+      </p:ext>
+    </p:extLst>
+  </p:cSld>
+  <p:clrMapOvr>
+    <a:masterClrMapping/>
+  </p:clrMapOvr>
+</p:sld>
+</file>
+
+<file path=ppt/slides/slide5.xml><?xml version="1.0" encoding="utf-8"?>
+<p:sld xmlns:a="http://schemas.openxmlformats.org/drawingml/2006/main" xmlns:r="http://schemas.openxmlformats.org/officeDocument/2006/relationships" xmlns:p="http://schemas.openxmlformats.org/presentationml/2006/main">
+  <p:cSld>
+    <p:spTree>
+      <p:nvGrpSpPr>
+        <p:cNvPr id="1" name=""/>
+        <p:cNvGrpSpPr/>
+        <p:nvPr/>
+      </p:nvGrpSpPr>
+      <p:grpSpPr>
+        <a:xfrm>
+          <a:off x="0" y="0"/>
+          <a:ext cx="0" cy="0"/>
+          <a:chOff x="0" y="0"/>
+          <a:chExt cx="0" cy="0"/>
+        </a:xfrm>
+      </p:grpSpPr>
+      <p:sp>
+        <p:nvSpPr>
+          <p:cNvPr id="4" name="文字方塊 3">
+            <a:extLst>
+              <a:ext uri="{FF2B5EF4-FFF2-40B4-BE49-F238E27FC236}">
+                <a16:creationId xmlns:a16="http://schemas.microsoft.com/office/drawing/2014/main" id="{6246D302-3C6E-40A0-BCE8-50973BF65F67}"/>
+              </a:ext>
+            </a:extLst>
+          </p:cNvPr>
+          <p:cNvSpPr txBox="1"/>
+          <p:nvPr/>
+        </p:nvSpPr>
+        <p:spPr>
+          <a:xfrm>
+            <a:off x="318256" y="506078"/>
+            <a:ext cx="10922000" cy="2308324"/>
+          </a:xfrm>
+          <a:prstGeom prst="rect">
+            <a:avLst/>
+          </a:prstGeom>
+          <a:noFill/>
+        </p:spPr>
+        <p:txBody>
+          <a:bodyPr wrap="square" rtlCol="0">
+            <a:spAutoFit/>
+          </a:bodyPr>
+          <a:lstStyle/>
+          <a:p>
+            <a:r>
+              <a:rPr lang="en-US" altLang="zh-CN" b="1" u="sng" dirty="0"/>
+              <a:t>SAX</a:t>
+            </a:r>
+            <a:r>
+              <a:rPr lang="zh-CN" altLang="en-US" b="1" u="sng" dirty="0"/>
+              <a:t>解析</a:t>
+            </a:r>
+            <a:endParaRPr lang="en-US" altLang="zh-CN" b="1" u="sng" dirty="0"/>
+          </a:p>
+          <a:p>
+            <a:r>
+              <a:rPr lang="en-US" altLang="zh-TW" dirty="0"/>
+              <a:t>	</a:t>
+            </a:r>
+          </a:p>
+          <a:p>
+            <a:r>
+              <a:rPr lang="en-US" altLang="zh-TW" dirty="0"/>
+              <a:t>	</a:t>
+            </a:r>
+            <a:r>
+              <a:rPr lang="en-US" altLang="zh-CN" dirty="0"/>
+              <a:t>SAX</a:t>
+            </a:r>
+            <a:r>
+              <a:rPr lang="zh-CN" altLang="en-US" dirty="0"/>
+              <a:t>解析式基于事件模型的</a:t>
+            </a:r>
+            <a:r>
+              <a:rPr lang="en-US" altLang="zh-CN" dirty="0"/>
+              <a:t>XML</a:t>
+            </a:r>
+            <a:r>
+              <a:rPr lang="zh-CN" altLang="en-US" dirty="0"/>
+              <a:t>解析方式</a:t>
+            </a:r>
+            <a:r>
+              <a:rPr lang="en-US" altLang="zh-CN" dirty="0"/>
+              <a:t>, </a:t>
+            </a:r>
+            <a:r>
+              <a:rPr lang="zh-CN" altLang="en-US" dirty="0"/>
+              <a:t>不需要将整个</a:t>
+            </a:r>
+            <a:r>
+              <a:rPr lang="en-US" altLang="zh-CN" dirty="0"/>
+              <a:t>XML</a:t>
+            </a:r>
+            <a:r>
+              <a:rPr lang="zh-CN" altLang="en-US" dirty="0"/>
+              <a:t>加载到内存</a:t>
+            </a:r>
+            <a:r>
+              <a:rPr lang="en-US" altLang="zh-CN" dirty="0"/>
+              <a:t>, </a:t>
+            </a:r>
+            <a:r>
+              <a:rPr lang="zh-CN" altLang="en-US" dirty="0"/>
+              <a:t>将部分</a:t>
+            </a:r>
+            <a:r>
+              <a:rPr lang="en-US" altLang="zh-CN" dirty="0"/>
+              <a:t>XML</a:t>
+            </a:r>
+            <a:r>
+              <a:rPr lang="zh-CN" altLang="en-US" dirty="0"/>
+              <a:t>文档加载到内存</a:t>
+            </a:r>
+            <a:r>
+              <a:rPr lang="en-US" altLang="zh-CN" dirty="0"/>
+              <a:t>, </a:t>
+            </a:r>
+            <a:r>
+              <a:rPr lang="zh-CN" altLang="en-US" dirty="0"/>
+              <a:t>就可开始解析</a:t>
+            </a:r>
+            <a:r>
+              <a:rPr lang="en-US" altLang="zh-CN" dirty="0"/>
+              <a:t>. </a:t>
+            </a:r>
+            <a:r>
+              <a:rPr lang="zh-CN" altLang="en-US" dirty="0"/>
+              <a:t>在解析过程中不会再内存中记录</a:t>
+            </a:r>
+            <a:r>
+              <a:rPr lang="en-US" altLang="zh-CN" dirty="0"/>
+              <a:t>XML</a:t>
+            </a:r>
+            <a:r>
+              <a:rPr lang="zh-CN" altLang="en-US" dirty="0"/>
+              <a:t>中的数据</a:t>
+            </a:r>
+            <a:r>
+              <a:rPr lang="en-US" altLang="zh-CN" dirty="0"/>
+              <a:t>, </a:t>
+            </a:r>
+            <a:r>
+              <a:rPr lang="zh-CN" altLang="en-US" dirty="0"/>
+              <a:t>占用内存资源较小</a:t>
+            </a:r>
+            <a:r>
+              <a:rPr lang="en-US" altLang="zh-CN" dirty="0"/>
+              <a:t>. </a:t>
+            </a:r>
+            <a:r>
+              <a:rPr lang="zh-CN" altLang="en-US" dirty="0"/>
+              <a:t>程序处理过程中满足条件时</a:t>
+            </a:r>
+            <a:r>
+              <a:rPr lang="en-US" altLang="zh-CN" dirty="0"/>
+              <a:t>, </a:t>
+            </a:r>
+            <a:r>
+              <a:rPr lang="zh-CN" altLang="en-US" dirty="0"/>
+              <a:t>可以立即停止解析</a:t>
+            </a:r>
+            <a:r>
+              <a:rPr lang="en-US" altLang="zh-CN" dirty="0"/>
+              <a:t>.</a:t>
+            </a:r>
+          </a:p>
+          <a:p>
+            <a:r>
+              <a:rPr lang="en-US" altLang="zh-TW" dirty="0"/>
+              <a:t>	</a:t>
+            </a:r>
+            <a:r>
+              <a:rPr lang="zh-CN" altLang="en-US" dirty="0"/>
+              <a:t>缺点因为不存储</a:t>
+            </a:r>
+            <a:r>
+              <a:rPr lang="en-US" altLang="zh-CN" dirty="0"/>
+              <a:t>XML</a:t>
+            </a:r>
+            <a:r>
+              <a:rPr lang="zh-CN" altLang="en-US" dirty="0"/>
+              <a:t>文档结构</a:t>
+            </a:r>
+            <a:r>
+              <a:rPr lang="en-US" altLang="zh-CN" dirty="0"/>
+              <a:t>, </a:t>
+            </a:r>
+            <a:r>
+              <a:rPr lang="zh-CN" altLang="en-US" dirty="0"/>
+              <a:t>所以需要开发人员自己负责维护业务逻辑涉及的多层节点的关系</a:t>
+            </a:r>
+            <a:r>
+              <a:rPr lang="en-US" altLang="zh-CN" dirty="0"/>
+              <a:t>.</a:t>
+            </a:r>
+            <a:r>
+              <a:rPr lang="zh-CN" altLang="en-US" dirty="0"/>
+              <a:t>因为</a:t>
+            </a:r>
+            <a:r>
+              <a:rPr lang="en-US" altLang="zh-CN" dirty="0"/>
+              <a:t>XML</a:t>
+            </a:r>
+            <a:r>
+              <a:rPr lang="zh-CN" altLang="en-US" dirty="0"/>
+              <a:t>是流式处理</a:t>
+            </a:r>
+            <a:r>
+              <a:rPr lang="en-US" altLang="zh-CN" dirty="0"/>
+              <a:t>, </a:t>
+            </a:r>
+            <a:r>
+              <a:rPr lang="zh-CN" altLang="en-US" dirty="0"/>
+              <a:t>处理过程只能从</a:t>
+            </a:r>
+            <a:r>
+              <a:rPr lang="en-US" altLang="zh-CN" dirty="0"/>
+              <a:t>xml</a:t>
+            </a:r>
+            <a:r>
+              <a:rPr lang="zh-CN" altLang="en-US" dirty="0"/>
+              <a:t>文档开始向后单向进行</a:t>
+            </a:r>
+            <a:r>
+              <a:rPr lang="en-US" altLang="zh-CN" dirty="0"/>
+              <a:t>.</a:t>
+            </a:r>
+            <a:endParaRPr lang="en-US" altLang="zh-TW" dirty="0"/>
+          </a:p>
+          <a:p>
+            <a:r>
+              <a:rPr lang="en-US" altLang="zh-TW" dirty="0"/>
+              <a:t>	</a:t>
+            </a:r>
+            <a:endParaRPr lang="zh-TW" altLang="en-US" dirty="0"/>
+          </a:p>
+        </p:txBody>
+      </p:sp>
+    </p:spTree>
+    <p:extLst>
+      <p:ext uri="{BB962C8B-B14F-4D97-AF65-F5344CB8AC3E}">
+        <p14:creationId xmlns:p14="http://schemas.microsoft.com/office/powerpoint/2010/main" val="627754803"/>
       </p:ext>
     </p:extLst>
   </p:cSld>

</xml_diff>

<commit_message>
Add MyBatis Study into java file
</commit_message>
<xml_diff>
--- a/JavaStudy/MyBatis/MyBatisStudyNote/MyBatisStudyNote.pptx
+++ b/JavaStudy/MyBatis/MyBatisStudyNote/MyBatisStudyNote.pptx
@@ -10,6 +10,7 @@
     <p:sldId id="258" r:id="rId4"/>
     <p:sldId id="259" r:id="rId5"/>
     <p:sldId id="260" r:id="rId6"/>
+    <p:sldId id="261" r:id="rId7"/>
   </p:sldIdLst>
   <p:sldSz cx="12192000" cy="6858000"/>
   <p:notesSz cx="6858000" cy="9144000"/>
@@ -245,7 +246,7 @@
           <a:p>
             <a:fld id="{5169B9EC-2E22-4EBE-8442-BE1B61D95B08}" type="datetimeFigureOut">
               <a:rPr lang="zh-CN" altLang="en-US" smtClean="0"/>
-              <a:t>2023/3/17</a:t>
+              <a:t>2023/3/21</a:t>
             </a:fld>
             <a:endParaRPr lang="zh-CN" altLang="en-US"/>
           </a:p>
@@ -413,7 +414,7 @@
           <a:p>
             <a:fld id="{5169B9EC-2E22-4EBE-8442-BE1B61D95B08}" type="datetimeFigureOut">
               <a:rPr lang="zh-CN" altLang="en-US" smtClean="0"/>
-              <a:t>2023/3/17</a:t>
+              <a:t>2023/3/21</a:t>
             </a:fld>
             <a:endParaRPr lang="zh-CN" altLang="en-US"/>
           </a:p>
@@ -591,7 +592,7 @@
           <a:p>
             <a:fld id="{5169B9EC-2E22-4EBE-8442-BE1B61D95B08}" type="datetimeFigureOut">
               <a:rPr lang="zh-CN" altLang="en-US" smtClean="0"/>
-              <a:t>2023/3/17</a:t>
+              <a:t>2023/3/21</a:t>
             </a:fld>
             <a:endParaRPr lang="zh-CN" altLang="en-US"/>
           </a:p>
@@ -759,7 +760,7 @@
           <a:p>
             <a:fld id="{5169B9EC-2E22-4EBE-8442-BE1B61D95B08}" type="datetimeFigureOut">
               <a:rPr lang="zh-CN" altLang="en-US" smtClean="0"/>
-              <a:t>2023/3/17</a:t>
+              <a:t>2023/3/21</a:t>
             </a:fld>
             <a:endParaRPr lang="zh-CN" altLang="en-US"/>
           </a:p>
@@ -1004,7 +1005,7 @@
           <a:p>
             <a:fld id="{5169B9EC-2E22-4EBE-8442-BE1B61D95B08}" type="datetimeFigureOut">
               <a:rPr lang="zh-CN" altLang="en-US" smtClean="0"/>
-              <a:t>2023/3/17</a:t>
+              <a:t>2023/3/21</a:t>
             </a:fld>
             <a:endParaRPr lang="zh-CN" altLang="en-US"/>
           </a:p>
@@ -1233,7 +1234,7 @@
           <a:p>
             <a:fld id="{5169B9EC-2E22-4EBE-8442-BE1B61D95B08}" type="datetimeFigureOut">
               <a:rPr lang="zh-CN" altLang="en-US" smtClean="0"/>
-              <a:t>2023/3/17</a:t>
+              <a:t>2023/3/21</a:t>
             </a:fld>
             <a:endParaRPr lang="zh-CN" altLang="en-US"/>
           </a:p>
@@ -1597,7 +1598,7 @@
           <a:p>
             <a:fld id="{5169B9EC-2E22-4EBE-8442-BE1B61D95B08}" type="datetimeFigureOut">
               <a:rPr lang="zh-CN" altLang="en-US" smtClean="0"/>
-              <a:t>2023/3/17</a:t>
+              <a:t>2023/3/21</a:t>
             </a:fld>
             <a:endParaRPr lang="zh-CN" altLang="en-US"/>
           </a:p>
@@ -1714,7 +1715,7 @@
           <a:p>
             <a:fld id="{5169B9EC-2E22-4EBE-8442-BE1B61D95B08}" type="datetimeFigureOut">
               <a:rPr lang="zh-CN" altLang="en-US" smtClean="0"/>
-              <a:t>2023/3/17</a:t>
+              <a:t>2023/3/21</a:t>
             </a:fld>
             <a:endParaRPr lang="zh-CN" altLang="en-US"/>
           </a:p>
@@ -1809,7 +1810,7 @@
           <a:p>
             <a:fld id="{5169B9EC-2E22-4EBE-8442-BE1B61D95B08}" type="datetimeFigureOut">
               <a:rPr lang="zh-CN" altLang="en-US" smtClean="0"/>
-              <a:t>2023/3/17</a:t>
+              <a:t>2023/3/21</a:t>
             </a:fld>
             <a:endParaRPr lang="zh-CN" altLang="en-US"/>
           </a:p>
@@ -2084,7 +2085,7 @@
           <a:p>
             <a:fld id="{5169B9EC-2E22-4EBE-8442-BE1B61D95B08}" type="datetimeFigureOut">
               <a:rPr lang="zh-CN" altLang="en-US" smtClean="0"/>
-              <a:t>2023/3/17</a:t>
+              <a:t>2023/3/21</a:t>
             </a:fld>
             <a:endParaRPr lang="zh-CN" altLang="en-US"/>
           </a:p>
@@ -2336,7 +2337,7 @@
           <a:p>
             <a:fld id="{5169B9EC-2E22-4EBE-8442-BE1B61D95B08}" type="datetimeFigureOut">
               <a:rPr lang="zh-CN" altLang="en-US" smtClean="0"/>
-              <a:t>2023/3/17</a:t>
+              <a:t>2023/3/21</a:t>
             </a:fld>
             <a:endParaRPr lang="zh-CN" altLang="en-US"/>
           </a:p>
@@ -2547,7 +2548,7 @@
           <a:p>
             <a:fld id="{5169B9EC-2E22-4EBE-8442-BE1B61D95B08}" type="datetimeFigureOut">
               <a:rPr lang="zh-CN" altLang="en-US" smtClean="0"/>
-              <a:t>2023/3/17</a:t>
+              <a:t>2023/3/21</a:t>
             </a:fld>
             <a:endParaRPr lang="zh-CN" altLang="en-US"/>
           </a:p>
@@ -3729,6 +3730,193 @@
 </p:sld>
 </file>
 
+<file path=ppt/slides/slide6.xml><?xml version="1.0" encoding="utf-8"?>
+<p:sld xmlns:a="http://schemas.openxmlformats.org/drawingml/2006/main" xmlns:r="http://schemas.openxmlformats.org/officeDocument/2006/relationships" xmlns:p="http://schemas.openxmlformats.org/presentationml/2006/main">
+  <p:cSld>
+    <p:spTree>
+      <p:nvGrpSpPr>
+        <p:cNvPr id="1" name=""/>
+        <p:cNvGrpSpPr/>
+        <p:nvPr/>
+      </p:nvGrpSpPr>
+      <p:grpSpPr>
+        <a:xfrm>
+          <a:off x="0" y="0"/>
+          <a:ext cx="0" cy="0"/>
+          <a:chOff x="0" y="0"/>
+          <a:chExt cx="0" cy="0"/>
+        </a:xfrm>
+      </p:grpSpPr>
+      <p:sp>
+        <p:nvSpPr>
+          <p:cNvPr id="4" name="文本框 3"/>
+          <p:cNvSpPr txBox="1"/>
+          <p:nvPr/>
+        </p:nvSpPr>
+        <p:spPr>
+          <a:xfrm>
+            <a:off x="249382" y="277091"/>
+            <a:ext cx="11665373" cy="2308324"/>
+          </a:xfrm>
+          <a:prstGeom prst="rect">
+            <a:avLst/>
+          </a:prstGeom>
+          <a:noFill/>
+        </p:spPr>
+        <p:txBody>
+          <a:bodyPr wrap="none" rtlCol="0">
+            <a:spAutoFit/>
+          </a:bodyPr>
+          <a:lstStyle/>
+          <a:p>
+            <a:r>
+              <a:rPr lang="en-US" altLang="zh-CN" b="1" u="sng" dirty="0" err="1" smtClean="0"/>
+              <a:t>Xpath</a:t>
+            </a:r>
+            <a:endParaRPr lang="en-US" altLang="zh-CN" b="1" u="sng" dirty="0" smtClean="0"/>
+          </a:p>
+          <a:p>
+            <a:endParaRPr lang="en-US" altLang="zh-CN" b="1" u="sng" dirty="0"/>
+          </a:p>
+          <a:p>
+            <a:r>
+              <a:rPr lang="en-US" altLang="zh-CN" dirty="0" smtClean="0"/>
+              <a:t>	1.  </a:t>
+            </a:r>
+            <a:r>
+              <a:rPr lang="en-US" altLang="zh-CN" dirty="0" err="1" smtClean="0"/>
+              <a:t>MyBatis</a:t>
+            </a:r>
+            <a:r>
+              <a:rPr lang="zh-CN" altLang="en-US" dirty="0" smtClean="0"/>
+              <a:t>在处理</a:t>
+            </a:r>
+            <a:r>
+              <a:rPr lang="en-US" altLang="zh-CN" dirty="0" smtClean="0"/>
+              <a:t>mybatis-config.xml </a:t>
+            </a:r>
+            <a:r>
+              <a:rPr lang="zh-CN" altLang="en-US" dirty="0" smtClean="0"/>
+              <a:t>配置文件以及映射文件时</a:t>
+            </a:r>
+            <a:r>
+              <a:rPr lang="en-US" altLang="zh-CN" dirty="0" smtClean="0"/>
+              <a:t>, </a:t>
+            </a:r>
+            <a:r>
+              <a:rPr lang="zh-CN" altLang="en-US" dirty="0" smtClean="0"/>
+              <a:t>使用的是</a:t>
+            </a:r>
+            <a:r>
+              <a:rPr lang="en-US" altLang="zh-CN" dirty="0" smtClean="0"/>
+              <a:t>Dom</a:t>
+            </a:r>
+            <a:r>
+              <a:rPr lang="zh-CN" altLang="en-US" dirty="0" smtClean="0"/>
+              <a:t>方式解析</a:t>
+            </a:r>
+            <a:r>
+              <a:rPr lang="en-US" altLang="zh-CN" dirty="0" smtClean="0"/>
+              <a:t>, </a:t>
+            </a:r>
+            <a:r>
+              <a:rPr lang="zh-CN" altLang="en-US" dirty="0" smtClean="0"/>
+              <a:t>并结合使用</a:t>
+            </a:r>
+            <a:r>
+              <a:rPr lang="en-US" altLang="zh-CN" dirty="0" err="1" smtClean="0"/>
+              <a:t>Xpath</a:t>
+            </a:r>
+            <a:endParaRPr lang="en-US" altLang="zh-CN" dirty="0" smtClean="0"/>
+          </a:p>
+          <a:p>
+            <a:r>
+              <a:rPr lang="en-US" altLang="zh-CN" dirty="0" smtClean="0"/>
+              <a:t>	    </a:t>
+            </a:r>
+            <a:r>
+              <a:rPr lang="zh-CN" altLang="en-US" dirty="0" smtClean="0"/>
+              <a:t>解析</a:t>
+            </a:r>
+            <a:r>
+              <a:rPr lang="en-US" altLang="zh-CN" dirty="0" smtClean="0"/>
+              <a:t>XML</a:t>
+            </a:r>
+            <a:r>
+              <a:rPr lang="zh-CN" altLang="en-US" dirty="0" smtClean="0"/>
+              <a:t>文件</a:t>
+            </a:r>
+            <a:endParaRPr lang="en-US" altLang="zh-CN" dirty="0" smtClean="0"/>
+          </a:p>
+          <a:p>
+            <a:endParaRPr lang="en-US" altLang="zh-CN" dirty="0"/>
+          </a:p>
+          <a:p>
+            <a:r>
+              <a:rPr lang="en-US" altLang="zh-CN" dirty="0" smtClean="0"/>
+              <a:t>	2.  XPath</a:t>
+            </a:r>
+            <a:r>
+              <a:rPr lang="zh-CN" altLang="en-US" dirty="0" smtClean="0"/>
+              <a:t>常用的表达式</a:t>
+            </a:r>
+            <a:endParaRPr lang="en-US" altLang="zh-CN" dirty="0" smtClean="0"/>
+          </a:p>
+          <a:p>
+            <a:endParaRPr lang="en-US" altLang="zh-CN" dirty="0"/>
+          </a:p>
+          <a:p>
+            <a:r>
+              <a:rPr lang="en-US" altLang="zh-CN" dirty="0" smtClean="0"/>
+              <a:t>		</a:t>
+            </a:r>
+            <a:endParaRPr lang="zh-CN" altLang="en-US" dirty="0"/>
+          </a:p>
+        </p:txBody>
+      </p:sp>
+      <p:pic>
+        <p:nvPicPr>
+          <p:cNvPr id="7" name="图片 6"/>
+          <p:cNvPicPr>
+            <a:picLocks noChangeAspect="1"/>
+          </p:cNvPicPr>
+          <p:nvPr/>
+        </p:nvPicPr>
+        <p:blipFill>
+          <a:blip r:embed="rId2">
+            <a:extLst>
+              <a:ext uri="{28A0092B-C50C-407E-A947-70E740481C1C}">
+                <a14:useLocalDpi xmlns:a14="http://schemas.microsoft.com/office/drawing/2010/main" val="0"/>
+              </a:ext>
+            </a:extLst>
+          </a:blip>
+          <a:stretch>
+            <a:fillRect/>
+          </a:stretch>
+        </p:blipFill>
+        <p:spPr>
+          <a:xfrm>
+            <a:off x="2105890" y="2124237"/>
+            <a:ext cx="7647710" cy="2821835"/>
+          </a:xfrm>
+          <a:prstGeom prst="rect">
+            <a:avLst/>
+          </a:prstGeom>
+        </p:spPr>
+      </p:pic>
+    </p:spTree>
+    <p:extLst>
+      <p:ext uri="{BB962C8B-B14F-4D97-AF65-F5344CB8AC3E}">
+        <p14:creationId xmlns:p14="http://schemas.microsoft.com/office/powerpoint/2010/main" val="3968338041"/>
+      </p:ext>
+    </p:extLst>
+  </p:cSld>
+  <p:clrMapOvr>
+    <a:masterClrMapping/>
+  </p:clrMapOvr>
+</p:sld>
+</file>
+
 <file path=ppt/theme/theme1.xml><?xml version="1.0" encoding="utf-8"?>
 <a:theme xmlns:a="http://schemas.openxmlformats.org/drawingml/2006/main" name="Office 主题​​">
   <a:themeElements>

</xml_diff>